<commit_message>
2020.12.20 1215PST making changes to the stats section and trying to figure out what the deal is with using the %>% break on line 2036
</commit_message>
<xml_diff>
--- a/KrillSparkleFunction_detailed.pptx
+++ b/KrillSparkleFunction_detailed.pptx
@@ -729,6 +729,90 @@
     <p:extLst>
       <p:ext uri="{BB962C8B-B14F-4D97-AF65-F5344CB8AC3E}">
         <p14:creationId xmlns:p14="http://schemas.microsoft.com/office/powerpoint/2010/main" val="2231538643"/>
+      </p:ext>
+    </p:extLst>
+  </p:cSld>
+  <p:clrMapOvr>
+    <a:masterClrMapping/>
+  </p:clrMapOvr>
+</p:notes>
+</file>
+
+<file path=ppt/notesSlides/notesSlide2.xml><?xml version="1.0" encoding="utf-8"?>
+<p:notes xmlns:a="http://schemas.openxmlformats.org/drawingml/2006/main" xmlns:r="http://schemas.openxmlformats.org/officeDocument/2006/relationships" xmlns:p="http://schemas.openxmlformats.org/presentationml/2006/main">
+  <p:cSld>
+    <p:spTree>
+      <p:nvGrpSpPr>
+        <p:cNvPr id="1" name=""/>
+        <p:cNvGrpSpPr/>
+        <p:nvPr/>
+      </p:nvGrpSpPr>
+      <p:grpSpPr>
+        <a:xfrm>
+          <a:off x="0" y="0"/>
+          <a:ext cx="0" cy="0"/>
+          <a:chOff x="0" y="0"/>
+          <a:chExt cx="0" cy="0"/>
+        </a:xfrm>
+      </p:grpSpPr>
+      <p:sp>
+        <p:nvSpPr>
+          <p:cNvPr id="2" name="Slide Image Placeholder 1"/>
+          <p:cNvSpPr>
+            <a:spLocks noGrp="1" noRot="1" noChangeAspect="1"/>
+          </p:cNvSpPr>
+          <p:nvPr>
+            <p:ph type="sldImg"/>
+          </p:nvPr>
+        </p:nvSpPr>
+        <p:spPr/>
+      </p:sp>
+      <p:sp>
+        <p:nvSpPr>
+          <p:cNvPr id="3" name="Notes Placeholder 2"/>
+          <p:cNvSpPr>
+            <a:spLocks noGrp="1"/>
+          </p:cNvSpPr>
+          <p:nvPr>
+            <p:ph type="body" idx="1"/>
+          </p:nvPr>
+        </p:nvSpPr>
+        <p:spPr/>
+        <p:txBody>
+          <a:bodyPr/>
+          <a:lstStyle/>
+          <a:p>
+            <a:endParaRPr lang="en-US"/>
+          </a:p>
+        </p:txBody>
+      </p:sp>
+      <p:sp>
+        <p:nvSpPr>
+          <p:cNvPr id="4" name="Slide Number Placeholder 3"/>
+          <p:cNvSpPr>
+            <a:spLocks noGrp="1"/>
+          </p:cNvSpPr>
+          <p:nvPr>
+            <p:ph type="sldNum" sz="quarter" idx="5"/>
+          </p:nvPr>
+        </p:nvSpPr>
+        <p:spPr/>
+        <p:txBody>
+          <a:bodyPr/>
+          <a:lstStyle/>
+          <a:p>
+            <a:fld id="{832D56A6-A850-2D4C-B317-A7F1F606D242}" type="slidenum">
+              <a:rPr lang="en-US" smtClean="0"/>
+              <a:t>2</a:t>
+            </a:fld>
+            <a:endParaRPr lang="en-US"/>
+          </a:p>
+        </p:txBody>
+      </p:sp>
+    </p:spTree>
+    <p:extLst>
+      <p:ext uri="{BB962C8B-B14F-4D97-AF65-F5344CB8AC3E}">
+        <p14:creationId xmlns:p14="http://schemas.microsoft.com/office/powerpoint/2010/main" val="1322515683"/>
       </p:ext>
     </p:extLst>
   </p:cSld>
@@ -5756,10 +5840,10 @@
             <p:nvPr/>
           </p:nvPicPr>
           <p:blipFill>
-            <a:blip r:embed="rId2">
+            <a:blip r:embed="rId3">
               <a:extLst>
                 <a:ext uri="{96DAC541-7B7A-43D3-8B79-37D633B846F1}">
-                  <asvg:svgBlip xmlns:asvg="http://schemas.microsoft.com/office/drawing/2016/SVG/main" r:embed="rId3"/>
+                  <asvg:svgBlip xmlns:asvg="http://schemas.microsoft.com/office/drawing/2016/SVG/main" r:embed="rId4"/>
                 </a:ext>
               </a:extLst>
             </a:blip>

</xml_diff>